<commit_message>
resize boss and add new levels
</commit_message>
<xml_diff>
--- a/Punks not ded! Презентация.pptx
+++ b/Punks not ded! Презентация.pptx
@@ -342,7 +342,7 @@
           <a:p>
             <a:fld id="{D9E246E8-FB9A-4191-B5C3-B1C414E316F3}" type="datetimeFigureOut">
               <a:rPr lang="ru-RU" smtClean="0"/>
-              <a:t>24.01.2020</a:t>
+              <a:t>25.01.2020</a:t>
             </a:fld>
             <a:endParaRPr lang="ru-RU"/>
           </a:p>
@@ -555,7 +555,7 @@
           <a:p>
             <a:fld id="{D9E246E8-FB9A-4191-B5C3-B1C414E316F3}" type="datetimeFigureOut">
               <a:rPr lang="ru-RU" smtClean="0"/>
-              <a:t>24.01.2020</a:t>
+              <a:t>25.01.2020</a:t>
             </a:fld>
             <a:endParaRPr lang="ru-RU"/>
           </a:p>
@@ -730,7 +730,7 @@
           <a:p>
             <a:fld id="{D9E246E8-FB9A-4191-B5C3-B1C414E316F3}" type="datetimeFigureOut">
               <a:rPr lang="ru-RU" smtClean="0"/>
-              <a:t>24.01.2020</a:t>
+              <a:t>25.01.2020</a:t>
             </a:fld>
             <a:endParaRPr lang="ru-RU"/>
           </a:p>
@@ -895,7 +895,7 @@
           <a:p>
             <a:fld id="{D9E246E8-FB9A-4191-B5C3-B1C414E316F3}" type="datetimeFigureOut">
               <a:rPr lang="ru-RU" smtClean="0"/>
-              <a:t>24.01.2020</a:t>
+              <a:t>25.01.2020</a:t>
             </a:fld>
             <a:endParaRPr lang="ru-RU"/>
           </a:p>
@@ -1179,7 +1179,7 @@
           <a:p>
             <a:fld id="{D9E246E8-FB9A-4191-B5C3-B1C414E316F3}" type="datetimeFigureOut">
               <a:rPr lang="ru-RU" smtClean="0"/>
-              <a:t>24.01.2020</a:t>
+              <a:t>25.01.2020</a:t>
             </a:fld>
             <a:endParaRPr lang="ru-RU"/>
           </a:p>
@@ -1505,7 +1505,7 @@
           <a:p>
             <a:fld id="{D9E246E8-FB9A-4191-B5C3-B1C414E316F3}" type="datetimeFigureOut">
               <a:rPr lang="ru-RU" smtClean="0"/>
-              <a:t>24.01.2020</a:t>
+              <a:t>25.01.2020</a:t>
             </a:fld>
             <a:endParaRPr lang="ru-RU"/>
           </a:p>
@@ -1930,7 +1930,7 @@
           <a:p>
             <a:fld id="{D9E246E8-FB9A-4191-B5C3-B1C414E316F3}" type="datetimeFigureOut">
               <a:rPr lang="ru-RU" smtClean="0"/>
-              <a:t>24.01.2020</a:t>
+              <a:t>25.01.2020</a:t>
             </a:fld>
             <a:endParaRPr lang="ru-RU"/>
           </a:p>
@@ -2103,7 +2103,7 @@
           <a:p>
             <a:fld id="{D9E246E8-FB9A-4191-B5C3-B1C414E316F3}" type="datetimeFigureOut">
               <a:rPr lang="ru-RU" smtClean="0"/>
-              <a:t>24.01.2020</a:t>
+              <a:t>25.01.2020</a:t>
             </a:fld>
             <a:endParaRPr lang="ru-RU"/>
           </a:p>
@@ -2193,7 +2193,7 @@
           <a:p>
             <a:fld id="{D9E246E8-FB9A-4191-B5C3-B1C414E316F3}" type="datetimeFigureOut">
               <a:rPr lang="ru-RU" smtClean="0"/>
-              <a:t>24.01.2020</a:t>
+              <a:t>25.01.2020</a:t>
             </a:fld>
             <a:endParaRPr lang="ru-RU"/>
           </a:p>
@@ -2473,7 +2473,7 @@
           <a:p>
             <a:fld id="{D9E246E8-FB9A-4191-B5C3-B1C414E316F3}" type="datetimeFigureOut">
               <a:rPr lang="ru-RU" smtClean="0"/>
-              <a:t>24.01.2020</a:t>
+              <a:t>25.01.2020</a:t>
             </a:fld>
             <a:endParaRPr lang="ru-RU"/>
           </a:p>
@@ -2772,7 +2772,7 @@
           <a:p>
             <a:fld id="{D9E246E8-FB9A-4191-B5C3-B1C414E316F3}" type="datetimeFigureOut">
               <a:rPr lang="ru-RU" smtClean="0"/>
-              <a:t>24.01.2020</a:t>
+              <a:t>25.01.2020</a:t>
             </a:fld>
             <a:endParaRPr lang="ru-RU"/>
           </a:p>
@@ -2982,7 +2982,7 @@
           <a:p>
             <a:fld id="{D9E246E8-FB9A-4191-B5C3-B1C414E316F3}" type="datetimeFigureOut">
               <a:rPr lang="ru-RU" smtClean="0"/>
-              <a:t>24.01.2020</a:t>
+              <a:t>25.01.2020</a:t>
             </a:fld>
             <a:endParaRPr lang="ru-RU"/>
           </a:p>
@@ -3782,8 +3782,17 @@
           <a:p>
             <a:r>
               <a:rPr lang="ru-RU" dirty="0" smtClean="0"/>
-              <a:t>Весь проект реализован на нескольких классах</a:t>
-            </a:r>
+              <a:t>Весь проект реализован на нескольких </a:t>
+            </a:r>
+            <a:r>
+              <a:rPr lang="ru-RU" dirty="0" smtClean="0"/>
+              <a:t>классах</a:t>
+            </a:r>
+            <a:r>
+              <a:rPr lang="en-US" dirty="0" smtClean="0"/>
+              <a:t>:</a:t>
+            </a:r>
+            <a:endParaRPr lang="ru-RU" dirty="0" smtClean="0"/>
           </a:p>
           <a:p>
             <a:pPr marL="0" indent="0">
@@ -3803,8 +3812,17 @@
           <a:p>
             <a:r>
               <a:rPr lang="ru-RU" dirty="0" smtClean="0"/>
-              <a:t>Только 4 класса не унаследованы от других</a:t>
-            </a:r>
+              <a:t>Только 4 класса не унаследованы от </a:t>
+            </a:r>
+            <a:r>
+              <a:rPr lang="ru-RU" dirty="0" smtClean="0"/>
+              <a:t>других</a:t>
+            </a:r>
+            <a:r>
+              <a:rPr lang="en-US" dirty="0" smtClean="0"/>
+              <a:t>:</a:t>
+            </a:r>
+            <a:endParaRPr lang="ru-RU" dirty="0" smtClean="0"/>
           </a:p>
           <a:p>
             <a:pPr marL="0" indent="0">
@@ -3815,18 +3833,44 @@
               <a:t>	</a:t>
             </a:r>
             <a:r>
+              <a:rPr lang="ru-RU" dirty="0"/>
+              <a:t> </a:t>
+            </a:r>
+            <a:r>
               <a:rPr lang="ru-RU" dirty="0" smtClean="0"/>
-              <a:t>Музыка, Главный, Карта и Комната</a:t>
-            </a:r>
-          </a:p>
-          <a:p>
+              <a:t>главный класс, класс музыки</a:t>
+            </a:r>
+            <a:r>
+              <a:rPr lang="ru-RU" dirty="0" smtClean="0"/>
+              <a:t>, карта </a:t>
+            </a:r>
+            <a:r>
+              <a:rPr lang="ru-RU" dirty="0" smtClean="0"/>
+              <a:t>и </a:t>
+            </a:r>
+            <a:r>
+              <a:rPr lang="ru-RU" dirty="0" smtClean="0"/>
+              <a:t>комната</a:t>
+            </a:r>
             <a:endParaRPr lang="ru-RU" dirty="0" smtClean="0"/>
           </a:p>
           <a:p>
+            <a:endParaRPr lang="ru-RU" dirty="0" smtClean="0"/>
+          </a:p>
+          <a:p>
             <a:r>
               <a:rPr lang="ru-RU" dirty="0" smtClean="0"/>
-              <a:t>В игре 3 вида подвижных спрайтов</a:t>
-            </a:r>
+              <a:t>В игре 3 вида подвижных </a:t>
+            </a:r>
+            <a:r>
+              <a:rPr lang="ru-RU" dirty="0" smtClean="0"/>
+              <a:t>спрайтов</a:t>
+            </a:r>
+            <a:r>
+              <a:rPr lang="en-US" dirty="0" smtClean="0"/>
+              <a:t>:</a:t>
+            </a:r>
+            <a:endParaRPr lang="ru-RU" dirty="0" smtClean="0"/>
           </a:p>
           <a:p>
             <a:pPr marL="0" indent="0">
@@ -3932,8 +3976,17 @@
           <a:p>
             <a:r>
               <a:rPr lang="ru-RU" dirty="0" smtClean="0"/>
-              <a:t>Ручная анимация персонажей, пуль и фона.</a:t>
-            </a:r>
+              <a:t>Ручная анимация персонажей, пуль и </a:t>
+            </a:r>
+            <a:r>
+              <a:rPr lang="ru-RU" dirty="0" smtClean="0"/>
+              <a:t>фона</a:t>
+            </a:r>
+            <a:r>
+              <a:rPr lang="en-US" dirty="0" smtClean="0"/>
+              <a:t>;</a:t>
+            </a:r>
+            <a:endParaRPr lang="ru-RU" dirty="0" smtClean="0"/>
           </a:p>
           <a:p>
             <a:endParaRPr lang="ru-RU" dirty="0" smtClean="0"/>
@@ -3949,17 +4002,35 @@
             </a:r>
             <a:r>
               <a:rPr lang="ru-RU" dirty="0" smtClean="0"/>
-              <a:t>анимации в игру</a:t>
-            </a:r>
-          </a:p>
-          <a:p>
+              <a:t>анимации в </a:t>
+            </a:r>
+            <a:r>
+              <a:rPr lang="ru-RU" dirty="0" smtClean="0"/>
+              <a:t>игру</a:t>
+            </a:r>
+            <a:r>
+              <a:rPr lang="en-US" dirty="0" smtClean="0"/>
+              <a:t>;</a:t>
+            </a:r>
             <a:endParaRPr lang="ru-RU" dirty="0" smtClean="0"/>
           </a:p>
           <a:p>
+            <a:endParaRPr lang="ru-RU" dirty="0" smtClean="0"/>
+          </a:p>
+          <a:p>
             <a:r>
               <a:rPr lang="ru-RU" dirty="0" smtClean="0"/>
-              <a:t>Оригинальные саундтреки записанные в студии</a:t>
-            </a:r>
+              <a:t>Оригинальные саундтреки записанные в </a:t>
+            </a:r>
+            <a:r>
+              <a:rPr lang="ru-RU" dirty="0" smtClean="0"/>
+              <a:t>студии</a:t>
+            </a:r>
+            <a:r>
+              <a:rPr lang="en-US" dirty="0" smtClean="0"/>
+              <a:t>;</a:t>
+            </a:r>
+            <a:endParaRPr lang="ru-RU" dirty="0" smtClean="0"/>
           </a:p>
           <a:p>
             <a:endParaRPr lang="ru-RU" dirty="0" smtClean="0"/>
@@ -3973,6 +4044,10 @@
               <a:rPr lang="ru-RU" dirty="0" err="1" smtClean="0"/>
               <a:t>плейлиста</a:t>
             </a:r>
+            <a:r>
+              <a:rPr lang="en-US" dirty="0" smtClean="0"/>
+              <a:t>;</a:t>
+            </a:r>
             <a:endParaRPr lang="ru-RU" dirty="0" smtClean="0"/>
           </a:p>
           <a:p>
@@ -3981,8 +4056,17 @@
           <a:p>
             <a:r>
               <a:rPr lang="ru-RU" dirty="0" smtClean="0"/>
-              <a:t>Случайная генерация комнат</a:t>
-            </a:r>
+              <a:t>Случайная генерация </a:t>
+            </a:r>
+            <a:r>
+              <a:rPr lang="ru-RU" dirty="0" smtClean="0"/>
+              <a:t>комнат</a:t>
+            </a:r>
+            <a:r>
+              <a:rPr lang="en-US" dirty="0"/>
+              <a:t>.</a:t>
+            </a:r>
+            <a:endParaRPr lang="ru-RU" dirty="0" smtClean="0"/>
           </a:p>
         </p:txBody>
       </p:sp>
@@ -4068,17 +4152,31 @@
           <a:p>
             <a:r>
               <a:rPr lang="ru-RU" dirty="0" smtClean="0"/>
-              <a:t>Новые враги</a:t>
-            </a:r>
-          </a:p>
-          <a:p>
+              <a:t>Создание новых врагов</a:t>
+            </a:r>
+            <a:r>
+              <a:rPr lang="en-US" dirty="0" smtClean="0"/>
+              <a:t>;</a:t>
+            </a:r>
             <a:endParaRPr lang="ru-RU" dirty="0" smtClean="0"/>
           </a:p>
           <a:p>
+            <a:endParaRPr lang="ru-RU" dirty="0" smtClean="0"/>
+          </a:p>
+          <a:p>
+            <a:r>
+              <a:rPr lang="ru-RU" dirty="0"/>
+              <a:t>Большего количества </a:t>
+            </a:r>
             <a:r>
               <a:rPr lang="ru-RU" dirty="0" smtClean="0"/>
-              <a:t>Больше разнообразных комнат</a:t>
-            </a:r>
+              <a:t>артефактов</a:t>
+            </a:r>
+            <a:r>
+              <a:rPr lang="en-US" dirty="0" smtClean="0"/>
+              <a:t>;</a:t>
+            </a:r>
+            <a:endParaRPr lang="ru-RU" dirty="0"/>
           </a:p>
           <a:p>
             <a:endParaRPr lang="ru-RU" dirty="0" smtClean="0"/>
@@ -4086,17 +4184,42 @@
           <a:p>
             <a:r>
               <a:rPr lang="ru-RU" dirty="0" smtClean="0"/>
-              <a:t>Больше артефактов</a:t>
-            </a:r>
-          </a:p>
-          <a:p>
+              <a:t>Больше </a:t>
+            </a:r>
+            <a:r>
+              <a:rPr lang="ru-RU" dirty="0" smtClean="0"/>
+              <a:t>разнообразных </a:t>
+            </a:r>
+            <a:r>
+              <a:rPr lang="ru-RU" dirty="0" smtClean="0"/>
+              <a:t>комнат</a:t>
+            </a:r>
+            <a:r>
+              <a:rPr lang="en-US" dirty="0" smtClean="0"/>
+              <a:t>;</a:t>
+            </a:r>
             <a:endParaRPr lang="ru-RU" dirty="0" smtClean="0"/>
           </a:p>
           <a:p>
+            <a:pPr marL="0" indent="0">
+              <a:buNone/>
+            </a:pPr>
+            <a:endParaRPr lang="ru-RU" dirty="0" smtClean="0"/>
+          </a:p>
+          <a:p>
             <a:r>
               <a:rPr lang="ru-RU" dirty="0" smtClean="0"/>
-              <a:t>Возможность перехода с этажа на этаж</a:t>
-            </a:r>
+              <a:t>Возможность перехода с этажа на </a:t>
+            </a:r>
+            <a:r>
+              <a:rPr lang="ru-RU" dirty="0" smtClean="0"/>
+              <a:t>этаж</a:t>
+            </a:r>
+            <a:r>
+              <a:rPr lang="en-US" dirty="0" smtClean="0"/>
+              <a:t>.</a:t>
+            </a:r>
+            <a:endParaRPr lang="ru-RU" dirty="0" smtClean="0"/>
           </a:p>
           <a:p>
             <a:endParaRPr lang="ru-RU" dirty="0"/>

</xml_diff>

<commit_message>
Added requirements and updated documents
</commit_message>
<xml_diff>
--- a/Punks not ded! Презентация.pptx
+++ b/Punks not ded! Презентация.pptx
@@ -109,6 +109,22 @@
       </a:defRPr>
     </a:lvl9pPr>
   </p:defaultTextStyle>
+  <p:extLst>
+    <p:ext uri="{EFAFB233-063F-42B5-8137-9DF3F51BA10A}">
+      <p15:sldGuideLst xmlns:p15="http://schemas.microsoft.com/office/powerpoint/2012/main">
+        <p15:guide id="1" orient="horz" pos="2160">
+          <p15:clr>
+            <a:srgbClr val="A4A3A4"/>
+          </p15:clr>
+        </p15:guide>
+        <p15:guide id="2" pos="2880">
+          <p15:clr>
+            <a:srgbClr val="A4A3A4"/>
+          </p15:clr>
+        </p15:guide>
+      </p15:sldGuideLst>
+    </p:ext>
+  </p:extLst>
 </p:presentation>
 </file>
 
@@ -3577,7 +3593,18 @@
           <a:p>
             <a:r>
               <a:rPr lang="ru-RU" dirty="0" smtClean="0"/>
-              <a:t>Авторы: </a:t>
+              <a:t>Авторы: 	Зотова </a:t>
+            </a:r>
+            <a:r>
+              <a:rPr lang="ru-RU" dirty="0"/>
+              <a:t>Екатерина</a:t>
+            </a:r>
+            <a:endParaRPr lang="ru-RU" dirty="0" smtClean="0"/>
+          </a:p>
+          <a:p>
+            <a:r>
+              <a:rPr lang="ru-RU" dirty="0" smtClean="0"/>
+              <a:t>		</a:t>
             </a:r>
             <a:r>
               <a:rPr lang="ru-RU" dirty="0" err="1" smtClean="0"/>
@@ -3587,17 +3614,6 @@
               <a:rPr lang="ru-RU" dirty="0" smtClean="0"/>
               <a:t> Роман</a:t>
             </a:r>
-          </a:p>
-          <a:p>
-            <a:r>
-              <a:rPr lang="ru-RU" dirty="0"/>
-              <a:t>	 </a:t>
-            </a:r>
-            <a:r>
-              <a:rPr lang="ru-RU" dirty="0" smtClean="0"/>
-              <a:t>    Зотова Екатерина</a:t>
-            </a:r>
-            <a:endParaRPr lang="ru-RU" dirty="0"/>
           </a:p>
         </p:txBody>
       </p:sp>
@@ -3686,51 +3702,15 @@
             </a:pPr>
             <a:r>
               <a:rPr lang="ru-RU" dirty="0" smtClean="0"/>
-              <a:t>Создать и</a:t>
+              <a:t>Создать игру в жанре </a:t>
+            </a:r>
+            <a:r>
+              <a:rPr lang="en-US" dirty="0" smtClean="0"/>
+              <a:t>roguelike</a:t>
             </a:r>
             <a:r>
               <a:rPr lang="ru-RU" dirty="0" smtClean="0"/>
-              <a:t>гру </a:t>
-            </a:r>
-            <a:r>
-              <a:rPr lang="ru-RU" dirty="0" smtClean="0"/>
-              <a:t>в жанре </a:t>
-            </a:r>
-            <a:r>
-              <a:rPr lang="en-US" dirty="0" err="1" smtClean="0"/>
-              <a:t>rougelike</a:t>
-            </a:r>
-            <a:r>
-              <a:rPr lang="ru-RU" dirty="0" smtClean="0"/>
-              <a:t>, </a:t>
-            </a:r>
-            <a:r>
-              <a:rPr lang="ru-RU" dirty="0" smtClean="0"/>
-              <a:t>где </a:t>
-            </a:r>
-            <a:r>
-              <a:rPr lang="ru-RU" dirty="0" smtClean="0"/>
-              <a:t>главный герой</a:t>
-            </a:r>
-            <a:r>
-              <a:rPr lang="ru-RU" dirty="0" smtClean="0"/>
-              <a:t> в поисках дороги в магазин забрёл в библиотеку </a:t>
-            </a:r>
-            <a:r>
-              <a:rPr lang="ru-RU" dirty="0" smtClean="0"/>
-              <a:t>и </a:t>
-            </a:r>
-            <a:r>
-              <a:rPr lang="ru-RU" dirty="0" smtClean="0"/>
-              <a:t>должен выбраться оттуда как можно </a:t>
-            </a:r>
-            <a:r>
-              <a:rPr lang="ru-RU" dirty="0" smtClean="0"/>
-              <a:t>скорей</a:t>
-            </a:r>
-            <a:r>
-              <a:rPr lang="ru-RU" dirty="0" smtClean="0"/>
-              <a:t>.</a:t>
+              <a:t>, где главный герой в поисках дороги в магазин забрёл в библиотеку и должен выбраться оттуда как можно скорей.</a:t>
             </a:r>
             <a:endParaRPr lang="ru-RU" dirty="0"/>
           </a:p>
@@ -3949,85 +3929,66 @@
           <a:bodyPr/>
           <a:lstStyle/>
           <a:p>
+            <a:pPr algn="just"/>
             <a:r>
               <a:rPr lang="ru-RU" dirty="0" smtClean="0"/>
-              <a:t>Весь проект реализован на нескольких классах</a:t>
+              <a:t>Весь проект реализован на 11 </a:t>
+            </a:r>
+            <a:r>
+              <a:rPr lang="ru-RU" dirty="0" smtClean="0"/>
+              <a:t>классах.</a:t>
+            </a:r>
+          </a:p>
+          <a:p>
+            <a:pPr algn="just"/>
+            <a:endParaRPr lang="ru-RU" dirty="0"/>
+          </a:p>
+          <a:p>
+            <a:pPr algn="just"/>
+            <a:r>
+              <a:rPr lang="ru-RU" dirty="0"/>
+              <a:t>Все классы, кроме главного, классов музыки, карты и </a:t>
+            </a:r>
+            <a:r>
+              <a:rPr lang="ru-RU" dirty="0" smtClean="0"/>
+              <a:t>комнаты унаследованы от других.</a:t>
+            </a:r>
+            <a:endParaRPr lang="ru-RU" dirty="0"/>
+          </a:p>
+          <a:p>
+            <a:endParaRPr lang="ru-RU" dirty="0" smtClean="0"/>
+          </a:p>
+          <a:p>
+            <a:r>
+              <a:rPr lang="ru-RU" dirty="0" smtClean="0"/>
+              <a:t>В игре 3 вида подвижных объектов</a:t>
             </a:r>
             <a:r>
               <a:rPr lang="en-US" dirty="0" smtClean="0"/>
               <a:t>:</a:t>
             </a:r>
+            <a:r>
+              <a:rPr lang="ru-RU" dirty="0" smtClean="0"/>
+              <a:t> </a:t>
+            </a:r>
+            <a:endParaRPr lang="ru-RU" dirty="0"/>
+          </a:p>
+          <a:p>
+            <a:pPr marL="0" indent="0">
+              <a:buNone/>
+            </a:pPr>
+            <a:r>
+              <a:rPr lang="ru-RU" dirty="0" smtClean="0"/>
+              <a:t>    Игрок, враги и босс.</a:t>
+            </a:r>
+          </a:p>
+          <a:p>
             <a:endParaRPr lang="ru-RU" dirty="0" smtClean="0"/>
           </a:p>
           <a:p>
-            <a:pPr marL="0" indent="0">
-              <a:buNone/>
-            </a:pPr>
             <a:r>
               <a:rPr lang="ru-RU" dirty="0" smtClean="0"/>
-              <a:t>	9 основных и 3 дополнительных.</a:t>
-            </a:r>
-          </a:p>
-          <a:p>
-            <a:pPr marL="0" indent="0">
-              <a:buNone/>
-            </a:pPr>
-            <a:endParaRPr lang="ru-RU" dirty="0"/>
-          </a:p>
-          <a:p>
-            <a:r>
-              <a:rPr lang="ru-RU" dirty="0" smtClean="0"/>
-              <a:t>Только 4 класса не унаследованы от других</a:t>
-            </a:r>
-            <a:r>
-              <a:rPr lang="en-US" dirty="0" smtClean="0"/>
-              <a:t>:</a:t>
-            </a:r>
-            <a:endParaRPr lang="ru-RU" dirty="0" smtClean="0"/>
-          </a:p>
-          <a:p>
-            <a:pPr marL="0" indent="0">
-              <a:buNone/>
-            </a:pPr>
-            <a:r>
-              <a:rPr lang="ru-RU" dirty="0"/>
-              <a:t>	 </a:t>
-            </a:r>
-            <a:r>
-              <a:rPr lang="ru-RU" dirty="0" smtClean="0"/>
-              <a:t>главный класс, класс музыки, карта и комната</a:t>
-            </a:r>
-          </a:p>
-          <a:p>
-            <a:endParaRPr lang="ru-RU" dirty="0" smtClean="0"/>
-          </a:p>
-          <a:p>
-            <a:r>
-              <a:rPr lang="ru-RU" dirty="0" smtClean="0"/>
-              <a:t>В игре 3 вида подвижных спрайтов</a:t>
-            </a:r>
-            <a:r>
-              <a:rPr lang="en-US" dirty="0" smtClean="0"/>
-              <a:t>:</a:t>
-            </a:r>
-            <a:endParaRPr lang="ru-RU" dirty="0" smtClean="0"/>
-          </a:p>
-          <a:p>
-            <a:pPr marL="0" indent="0">
-              <a:buNone/>
-            </a:pPr>
-            <a:r>
-              <a:rPr lang="ru-RU" dirty="0" smtClean="0"/>
-              <a:t>	Игрок, враги и босс</a:t>
-            </a:r>
-          </a:p>
-          <a:p>
-            <a:endParaRPr lang="ru-RU" dirty="0" smtClean="0"/>
-          </a:p>
-          <a:p>
-            <a:r>
-              <a:rPr lang="ru-RU" dirty="0" smtClean="0"/>
-              <a:t>Боты имеют примитивный ИИ</a:t>
+              <a:t>Боты имеют примитивный ИИ.</a:t>
             </a:r>
           </a:p>
           <a:p>
@@ -4058,7 +4019,7 @@
         </p:blipFill>
         <p:spPr bwMode="auto">
           <a:xfrm>
-            <a:off x="6156176" y="3277898"/>
+            <a:off x="6412160" y="2796931"/>
             <a:ext cx="2480320" cy="2576285"/>
           </a:xfrm>
           <a:prstGeom prst="rect">
@@ -4174,7 +4135,7 @@
         <p:spPr/>
         <p:txBody>
           <a:bodyPr>
-            <a:normAutofit lnSpcReduction="10000"/>
+            <a:normAutofit/>
           </a:bodyPr>
           <a:lstStyle/>
           <a:p>
@@ -4216,7 +4177,7 @@
           <a:p>
             <a:r>
               <a:rPr lang="ru-RU" dirty="0" smtClean="0"/>
-              <a:t>Оригинальные саундтреки записанные в студии</a:t>
+              <a:t>Оригинальные саундтреки</a:t>
             </a:r>
             <a:r>
               <a:rPr lang="en-US" dirty="0" smtClean="0"/>
@@ -4225,33 +4186,18 @@
             <a:endParaRPr lang="ru-RU" dirty="0" smtClean="0"/>
           </a:p>
           <a:p>
+            <a:pPr marL="0" indent="0">
+              <a:buNone/>
+            </a:pPr>
             <a:endParaRPr lang="ru-RU" dirty="0" smtClean="0"/>
           </a:p>
           <a:p>
             <a:r>
               <a:rPr lang="ru-RU" dirty="0" smtClean="0"/>
-              <a:t>Возможность воспроизведения своего </a:t>
-            </a:r>
-            <a:r>
-              <a:rPr lang="ru-RU" dirty="0" err="1" smtClean="0"/>
-              <a:t>плейлиста</a:t>
+              <a:t>Случайная генерация карты</a:t>
             </a:r>
             <a:r>
               <a:rPr lang="en-US" dirty="0" smtClean="0"/>
-              <a:t>;</a:t>
-            </a:r>
-            <a:endParaRPr lang="ru-RU" dirty="0" smtClean="0"/>
-          </a:p>
-          <a:p>
-            <a:endParaRPr lang="ru-RU" dirty="0" smtClean="0"/>
-          </a:p>
-          <a:p>
-            <a:r>
-              <a:rPr lang="ru-RU" dirty="0" smtClean="0"/>
-              <a:t>Случайная генерация комнат</a:t>
-            </a:r>
-            <a:r>
-              <a:rPr lang="en-US" dirty="0"/>
               <a:t>.</a:t>
             </a:r>
             <a:endParaRPr lang="ru-RU" dirty="0" smtClean="0"/>
@@ -4451,8 +4397,8 @@
         </p:nvSpPr>
         <p:spPr>
           <a:xfrm>
-            <a:off x="827584" y="908720"/>
-            <a:ext cx="6781800" cy="3391272"/>
+            <a:off x="1187624" y="2420888"/>
+            <a:ext cx="6781800" cy="1231032"/>
           </a:xfrm>
         </p:spPr>
         <p:txBody>
@@ -4463,30 +4409,6 @@
               <a:rPr lang="ru-RU" dirty="0" smtClean="0"/>
               <a:t>Спасибо за внимание</a:t>
             </a:r>
-            <a:endParaRPr lang="ru-RU" dirty="0"/>
-          </a:p>
-        </p:txBody>
-      </p:sp>
-      <p:sp>
-        <p:nvSpPr>
-          <p:cNvPr id="3" name="Объект 2"/>
-          <p:cNvSpPr>
-            <a:spLocks noGrp="1"/>
-          </p:cNvSpPr>
-          <p:nvPr>
-            <p:ph idx="1"/>
-          </p:nvPr>
-        </p:nvSpPr>
-        <p:spPr>
-          <a:xfrm>
-            <a:off x="762000" y="685800"/>
-            <a:ext cx="7543800" cy="1375048"/>
-          </a:xfrm>
-        </p:spPr>
-        <p:txBody>
-          <a:bodyPr/>
-          <a:lstStyle/>
-          <a:p>
             <a:endParaRPr lang="ru-RU" dirty="0"/>
           </a:p>
         </p:txBody>

</xml_diff>